<commit_message>
se actualiza semana 4, se incluyen archivos PSoC de Contador, Timer, RTC y PWM, hace falta testear RTC
</commit_message>
<xml_diff>
--- a/Sesion_4/Sesion_4.pptx
+++ b/Sesion_4/Sesion_4.pptx
@@ -406,7 +406,7 @@
   <pc:docChgLst>
     <pc:chgData name="JHEYSON FABIAN VILLAVISAN BUITRAGO" userId="e5ced5c2-d787-455d-b115-4f08a699b8c8" providerId="ADAL" clId="{43CD82EC-B284-4EA6-8C2F-FEF84E1A756B}"/>
     <pc:docChg chg="undo custSel modSld">
-      <pc:chgData name="JHEYSON FABIAN VILLAVISAN BUITRAGO" userId="e5ced5c2-d787-455d-b115-4f08a699b8c8" providerId="ADAL" clId="{43CD82EC-B284-4EA6-8C2F-FEF84E1A756B}" dt="2025-02-10T21:57:31.475" v="746" actId="313"/>
+      <pc:chgData name="JHEYSON FABIAN VILLAVISAN BUITRAGO" userId="e5ced5c2-d787-455d-b115-4f08a699b8c8" providerId="ADAL" clId="{43CD82EC-B284-4EA6-8C2F-FEF84E1A756B}" dt="2025-02-11T16:16:27.918" v="773" actId="14100"/>
       <pc:docMkLst>
         <pc:docMk/>
       </pc:docMkLst>
@@ -426,13 +426,28 @@
         </pc:spChg>
       </pc:sldChg>
       <pc:sldChg chg="modSp mod">
-        <pc:chgData name="JHEYSON FABIAN VILLAVISAN BUITRAGO" userId="e5ced5c2-d787-455d-b115-4f08a699b8c8" providerId="ADAL" clId="{43CD82EC-B284-4EA6-8C2F-FEF84E1A756B}" dt="2025-02-10T21:57:31.475" v="746" actId="313"/>
+        <pc:chgData name="JHEYSON FABIAN VILLAVISAN BUITRAGO" userId="e5ced5c2-d787-455d-b115-4f08a699b8c8" providerId="ADAL" clId="{43CD82EC-B284-4EA6-8C2F-FEF84E1A756B}" dt="2025-02-11T12:17:10.647" v="772" actId="20577"/>
+        <pc:sldMkLst>
+          <pc:docMk/>
+          <pc:sldMk cId="2965408220" sldId="280"/>
+        </pc:sldMkLst>
+        <pc:spChg chg="mod">
+          <ac:chgData name="JHEYSON FABIAN VILLAVISAN BUITRAGO" userId="e5ced5c2-d787-455d-b115-4f08a699b8c8" providerId="ADAL" clId="{43CD82EC-B284-4EA6-8C2F-FEF84E1A756B}" dt="2025-02-11T12:17:10.647" v="772" actId="20577"/>
+          <ac:spMkLst>
+            <pc:docMk/>
+            <pc:sldMk cId="2965408220" sldId="280"/>
+            <ac:spMk id="11266" creationId="{74AD047A-E86C-4E92-874D-BAA043AB0B46}"/>
+          </ac:spMkLst>
+        </pc:spChg>
+      </pc:sldChg>
+      <pc:sldChg chg="modSp mod">
+        <pc:chgData name="JHEYSON FABIAN VILLAVISAN BUITRAGO" userId="e5ced5c2-d787-455d-b115-4f08a699b8c8" providerId="ADAL" clId="{43CD82EC-B284-4EA6-8C2F-FEF84E1A756B}" dt="2025-02-11T16:16:27.918" v="773" actId="14100"/>
         <pc:sldMkLst>
           <pc:docMk/>
           <pc:sldMk cId="4035662027" sldId="286"/>
         </pc:sldMkLst>
         <pc:spChg chg="mod">
-          <ac:chgData name="JHEYSON FABIAN VILLAVISAN BUITRAGO" userId="e5ced5c2-d787-455d-b115-4f08a699b8c8" providerId="ADAL" clId="{43CD82EC-B284-4EA6-8C2F-FEF84E1A756B}" dt="2025-02-10T21:57:31.475" v="746" actId="313"/>
+          <ac:chgData name="JHEYSON FABIAN VILLAVISAN BUITRAGO" userId="e5ced5c2-d787-455d-b115-4f08a699b8c8" providerId="ADAL" clId="{43CD82EC-B284-4EA6-8C2F-FEF84E1A756B}" dt="2025-02-11T16:16:27.918" v="773" actId="14100"/>
           <ac:spMkLst>
             <pc:docMk/>
             <pc:sldMk cId="4035662027" sldId="286"/>
@@ -1102,7 +1117,7 @@
               <a:pPr>
                 <a:defRPr/>
               </a:pPr>
-              <a:t>10/02/2025</a:t>
+              <a:t>11/02/2025</a:t>
             </a:fld>
             <a:endParaRPr lang="es-CO"/>
           </a:p>
@@ -1345,7 +1360,7 @@
               <a:pPr>
                 <a:defRPr/>
               </a:pPr>
-              <a:t>10/02/2025</a:t>
+              <a:t>11/02/2025</a:t>
             </a:fld>
             <a:endParaRPr lang="es-CO"/>
           </a:p>
@@ -2421,7 +2436,7 @@
           <a:p>
             <a:fld id="{9CF7635E-2D71-42E7-9E6C-FBB85A15A85F}" type="datetimeFigureOut">
               <a:rPr lang="es-CO" smtClean="0"/>
-              <a:t>10/02/2025</a:t>
+              <a:t>11/02/2025</a:t>
             </a:fld>
             <a:endParaRPr lang="es-CO"/>
           </a:p>
@@ -2687,7 +2702,7 @@
           <a:p>
             <a:fld id="{9CF7635E-2D71-42E7-9E6C-FBB85A15A85F}" type="datetimeFigureOut">
               <a:rPr lang="es-CO" smtClean="0"/>
-              <a:t>10/02/2025</a:t>
+              <a:t>11/02/2025</a:t>
             </a:fld>
             <a:endParaRPr lang="es-CO"/>
           </a:p>
@@ -2903,7 +2918,7 @@
           <a:p>
             <a:fld id="{9CF7635E-2D71-42E7-9E6C-FBB85A15A85F}" type="datetimeFigureOut">
               <a:rPr lang="es-CO" smtClean="0"/>
-              <a:t>10/02/2025</a:t>
+              <a:t>11/02/2025</a:t>
             </a:fld>
             <a:endParaRPr lang="es-CO"/>
           </a:p>
@@ -4532,7 +4547,7 @@
           <a:p>
             <a:fld id="{9CF7635E-2D71-42E7-9E6C-FBB85A15A85F}" type="datetimeFigureOut">
               <a:rPr lang="es-CO" smtClean="0"/>
-              <a:t>10/02/2025</a:t>
+              <a:t>11/02/2025</a:t>
             </a:fld>
             <a:endParaRPr lang="es-CO"/>
           </a:p>
@@ -4979,7 +4994,7 @@
           <a:p>
             <a:fld id="{9CF7635E-2D71-42E7-9E6C-FBB85A15A85F}" type="datetimeFigureOut">
               <a:rPr lang="es-CO" smtClean="0"/>
-              <a:t>10/02/2025</a:t>
+              <a:t>11/02/2025</a:t>
             </a:fld>
             <a:endParaRPr lang="es-CO"/>
           </a:p>
@@ -5253,7 +5268,7 @@
           <a:p>
             <a:fld id="{9CF7635E-2D71-42E7-9E6C-FBB85A15A85F}" type="datetimeFigureOut">
               <a:rPr lang="es-CO" smtClean="0"/>
-              <a:t>10/02/2025</a:t>
+              <a:t>11/02/2025</a:t>
             </a:fld>
             <a:endParaRPr lang="es-CO"/>
           </a:p>
@@ -5674,7 +5689,7 @@
           <a:p>
             <a:fld id="{9CF7635E-2D71-42E7-9E6C-FBB85A15A85F}" type="datetimeFigureOut">
               <a:rPr lang="es-CO" smtClean="0"/>
-              <a:t>10/02/2025</a:t>
+              <a:t>11/02/2025</a:t>
             </a:fld>
             <a:endParaRPr lang="es-CO"/>
           </a:p>
@@ -5822,7 +5837,7 @@
           <a:p>
             <a:fld id="{9CF7635E-2D71-42E7-9E6C-FBB85A15A85F}" type="datetimeFigureOut">
               <a:rPr lang="es-CO" smtClean="0"/>
-              <a:t>10/02/2025</a:t>
+              <a:t>11/02/2025</a:t>
             </a:fld>
             <a:endParaRPr lang="es-CO"/>
           </a:p>
@@ -5941,7 +5956,7 @@
           <a:p>
             <a:fld id="{9CF7635E-2D71-42E7-9E6C-FBB85A15A85F}" type="datetimeFigureOut">
               <a:rPr lang="es-CO" smtClean="0"/>
-              <a:t>10/02/2025</a:t>
+              <a:t>11/02/2025</a:t>
             </a:fld>
             <a:endParaRPr lang="es-CO"/>
           </a:p>
@@ -6260,7 +6275,7 @@
           <a:p>
             <a:fld id="{9CF7635E-2D71-42E7-9E6C-FBB85A15A85F}" type="datetimeFigureOut">
               <a:rPr lang="es-CO" smtClean="0"/>
-              <a:t>10/02/2025</a:t>
+              <a:t>11/02/2025</a:t>
             </a:fld>
             <a:endParaRPr lang="es-CO"/>
           </a:p>
@@ -6555,7 +6570,7 @@
           <a:p>
             <a:fld id="{9CF7635E-2D71-42E7-9E6C-FBB85A15A85F}" type="datetimeFigureOut">
               <a:rPr lang="es-CO" smtClean="0"/>
-              <a:t>10/02/2025</a:t>
+              <a:t>11/02/2025</a:t>
             </a:fld>
             <a:endParaRPr lang="es-CO"/>
           </a:p>
@@ -6804,7 +6819,7 @@
           <a:p>
             <a:fld id="{9CF7635E-2D71-42E7-9E6C-FBB85A15A85F}" type="datetimeFigureOut">
               <a:rPr lang="es-CO" smtClean="0"/>
-              <a:t>10/02/2025</a:t>
+              <a:t>11/02/2025</a:t>
             </a:fld>
             <a:endParaRPr lang="es-CO"/>
           </a:p>
@@ -7878,7 +7893,7 @@
             <a:pPr algn="ctr" eaLnBrk="1" hangingPunct="1"/>
             <a:r>
               <a:rPr lang="es-CO" altLang="es-CO" sz="3600" dirty="0"/>
-              <a:t>4</a:t>
+              <a:t>2</a:t>
             </a:r>
           </a:p>
         </p:txBody>
@@ -12830,7 +12845,7 @@
         <p:spPr>
           <a:xfrm>
             <a:off x="899592" y="2288363"/>
-            <a:ext cx="7432589" cy="1605049"/>
+            <a:ext cx="7432589" cy="3516901"/>
           </a:xfrm>
         </p:spPr>
         <p:txBody>
@@ -12961,7 +12976,20 @@
               <a:rPr lang="es-CO" sz="1400" b="1" dirty="0">
                 <a:latin typeface="+mj-lt"/>
               </a:rPr>
-              <a:t>Al usuario 1000 (Implemente un contador) se le dará un premio (El grupo define el sistema de notificación ej. Sonoro o visual etc.). El sistema debe almacenar en memoria la fecha y hora de este evento (RTC+EEPROM).</a:t>
+              <a:t>Al usuario 1000 (Implemente un contador) se le dará un premio (El grupo define el sistema de notificación ej. Sonoro o visual etc.). El sistema debe almacenar en memoria la fecha y hora de este evento (RTC</a:t>
+            </a:r>
+            <a:r>
+              <a:rPr lang="es-CO" sz="1400" b="1" dirty="0">
+                <a:latin typeface="+mj-lt"/>
+                <a:sym typeface="Wingdings" panose="05000000000000000000" pitchFamily="2" charset="2"/>
+              </a:rPr>
+              <a:t></a:t>
+            </a:r>
+            <a:r>
+              <a:rPr lang="es-CO" sz="1400" b="1" dirty="0">
+                <a:latin typeface="+mj-lt"/>
+              </a:rPr>
+              <a:t> EEPROM).</a:t>
             </a:r>
             <a:endParaRPr lang="es-CO" sz="1400" b="1" noProof="0" dirty="0">
               <a:latin typeface="+mj-lt"/>
@@ -14318,14 +14346,6 @@
 </file>
 
 <file path=customXml/item1.xml><?xml version="1.0" encoding="utf-8"?>
-<p:properties xmlns:p="http://schemas.microsoft.com/office/2006/metadata/properties" xmlns:xsi="http://www.w3.org/2001/XMLSchema-instance" xmlns:pc="http://schemas.microsoft.com/office/infopath/2007/PartnerControls">
-  <documentManagement>
-    <_activity xmlns="bdc56f61-abc0-4f7e-bfec-a93ccd1ae886" xsi:nil="true"/>
-  </documentManagement>
-</p:properties>
-</file>
-
-<file path=customXml/item2.xml><?xml version="1.0" encoding="utf-8"?>
 <?mso-contentType ?>
 <FormTemplates xmlns="http://schemas.microsoft.com/sharepoint/v3/contenttype/forms">
   <Display>DocumentLibraryForm</Display>
@@ -14334,7 +14354,7 @@
 </FormTemplates>
 </file>
 
-<file path=customXml/item3.xml><?xml version="1.0" encoding="utf-8"?>
+<file path=customXml/item2.xml><?xml version="1.0" encoding="utf-8"?>
 <ct:contentTypeSchema xmlns:ct="http://schemas.microsoft.com/office/2006/metadata/contentType" xmlns:ma="http://schemas.microsoft.com/office/2006/metadata/properties/metaAttributes" ct:_="" ma:_="" ma:contentTypeName="Documento" ma:contentTypeID="0x0101007A62137D465CE64A8C883A4664514BF8" ma:contentTypeVersion="15" ma:contentTypeDescription="Crear nuevo documento." ma:contentTypeScope="" ma:versionID="a1bd1d59f691eb9bca6952b111268275">
   <xsd:schema xmlns:xsd="http://www.w3.org/2001/XMLSchema" xmlns:xs="http://www.w3.org/2001/XMLSchema" xmlns:p="http://schemas.microsoft.com/office/2006/metadata/properties" xmlns:ns3="669280c1-d17e-4d1d-bd7f-b4f14cc6bf1d" xmlns:ns4="bdc56f61-abc0-4f7e-bfec-a93ccd1ae886" targetNamespace="http://schemas.microsoft.com/office/2006/metadata/properties" ma:root="true" ma:fieldsID="d02990a02f19f0f9fc7b999b1809cae4" ns3:_="" ns4:_="">
     <xsd:import namespace="669280c1-d17e-4d1d-bd7f-b4f14cc6bf1d"/>
@@ -14569,24 +14589,15 @@
 </ct:contentTypeSchema>
 </file>
 
-<file path=customXml/itemProps1.xml><?xml version="1.0" encoding="utf-8"?>
-<ds:datastoreItem xmlns:ds="http://schemas.openxmlformats.org/officeDocument/2006/customXml" ds:itemID="{0825853C-1B27-4995-A583-4D39F900BB7F}">
-  <ds:schemaRefs>
-    <ds:schemaRef ds:uri="http://schemas.microsoft.com/office/2006/documentManagement/types"/>
-    <ds:schemaRef ds:uri="http://purl.org/dc/dcmitype/"/>
-    <ds:schemaRef ds:uri="http://schemas.openxmlformats.org/package/2006/metadata/core-properties"/>
-    <ds:schemaRef ds:uri="669280c1-d17e-4d1d-bd7f-b4f14cc6bf1d"/>
-    <ds:schemaRef ds:uri="http://purl.org/dc/elements/1.1/"/>
-    <ds:schemaRef ds:uri="http://purl.org/dc/terms/"/>
-    <ds:schemaRef ds:uri="http://schemas.microsoft.com/office/infopath/2007/PartnerControls"/>
-    <ds:schemaRef ds:uri="bdc56f61-abc0-4f7e-bfec-a93ccd1ae886"/>
-    <ds:schemaRef ds:uri="http://schemas.microsoft.com/office/2006/metadata/properties"/>
-    <ds:schemaRef ds:uri="http://www.w3.org/XML/1998/namespace"/>
-  </ds:schemaRefs>
-</ds:datastoreItem>
+<file path=customXml/item3.xml><?xml version="1.0" encoding="utf-8"?>
+<p:properties xmlns:p="http://schemas.microsoft.com/office/2006/metadata/properties" xmlns:xsi="http://www.w3.org/2001/XMLSchema-instance" xmlns:pc="http://schemas.microsoft.com/office/infopath/2007/PartnerControls">
+  <documentManagement>
+    <_activity xmlns="bdc56f61-abc0-4f7e-bfec-a93ccd1ae886" xsi:nil="true"/>
+  </documentManagement>
+</p:properties>
 </file>
 
-<file path=customXml/itemProps2.xml><?xml version="1.0" encoding="utf-8"?>
+<file path=customXml/itemProps1.xml><?xml version="1.0" encoding="utf-8"?>
 <ds:datastoreItem xmlns:ds="http://schemas.openxmlformats.org/officeDocument/2006/customXml" ds:itemID="{4E8623C8-32E1-48B0-9F0A-13F2E9582B7E}">
   <ds:schemaRefs>
     <ds:schemaRef ds:uri="http://schemas.microsoft.com/sharepoint/v3/contenttype/forms"/>
@@ -14594,7 +14605,7 @@
 </ds:datastoreItem>
 </file>
 
-<file path=customXml/itemProps3.xml><?xml version="1.0" encoding="utf-8"?>
+<file path=customXml/itemProps2.xml><?xml version="1.0" encoding="utf-8"?>
 <ds:datastoreItem xmlns:ds="http://schemas.openxmlformats.org/officeDocument/2006/customXml" ds:itemID="{025820C3-FD82-4EFC-BF14-EAF1F9613F52}">
   <ds:schemaRefs>
     <ds:schemaRef ds:uri="http://schemas.microsoft.com/office/2006/metadata/contentType"/>
@@ -14611,4 +14622,21 @@
     <ds:schemaRef ds:uri="http://schemas.microsoft.com/internal/obd"/>
   </ds:schemaRefs>
 </ds:datastoreItem>
+</file>
+
+<file path=customXml/itemProps3.xml><?xml version="1.0" encoding="utf-8"?>
+<ds:datastoreItem xmlns:ds="http://schemas.openxmlformats.org/officeDocument/2006/customXml" ds:itemID="{0825853C-1B27-4995-A583-4D39F900BB7F}">
+  <ds:schemaRefs>
+    <ds:schemaRef ds:uri="http://schemas.microsoft.com/office/2006/documentManagement/types"/>
+    <ds:schemaRef ds:uri="http://purl.org/dc/dcmitype/"/>
+    <ds:schemaRef ds:uri="http://schemas.openxmlformats.org/package/2006/metadata/core-properties"/>
+    <ds:schemaRef ds:uri="669280c1-d17e-4d1d-bd7f-b4f14cc6bf1d"/>
+    <ds:schemaRef ds:uri="http://purl.org/dc/elements/1.1/"/>
+    <ds:schemaRef ds:uri="http://purl.org/dc/terms/"/>
+    <ds:schemaRef ds:uri="http://schemas.microsoft.com/office/infopath/2007/PartnerControls"/>
+    <ds:schemaRef ds:uri="bdc56f61-abc0-4f7e-bfec-a93ccd1ae886"/>
+    <ds:schemaRef ds:uri="http://schemas.microsoft.com/office/2006/metadata/properties"/>
+    <ds:schemaRef ds:uri="http://www.w3.org/XML/1998/namespace"/>
+  </ds:schemaRefs>
+</ds:datastoreItem>
 </file>
</xml_diff>